<commit_message>
Update to slides and code
</commit_message>
<xml_diff>
--- a/Dont Bash PowerShell.pptx
+++ b/Dont Bash PowerShell.pptx
@@ -129,15 +129,6 @@
 </p:presentation>
 </file>
 
-<file path=ppt/revisionInfo.xml><?xml version="1.0" encoding="utf-8"?>
-<p1510:revInfo xmlns:a="http://schemas.openxmlformats.org/drawingml/2006/main" xmlns:r="http://schemas.openxmlformats.org/officeDocument/2006/relationships" xmlns:p1510="http://schemas.microsoft.com/office/powerpoint/2015/10/main">
-  <p1510:revLst>
-    <p1510:client id="{1323DB8C-793E-4F7D-9BF2-134C36F476AD}" v="57" dt="2025-10-15T16:18:42.883"/>
-    <p1510:client id="{EE9CBF9E-1CC5-41E6-8FF6-CE7B3F54CC9A}" v="1" dt="2025-10-16T00:25:46.164"/>
-  </p1510:revLst>
-</p1510:revInfo>
-</file>
-
 <file path=ppt/notesMasters/notesMaster1.xml><?xml version="1.0" encoding="utf-8"?>
 <p:notesMaster xmlns:a="http://schemas.openxmlformats.org/drawingml/2006/main" xmlns:r="http://schemas.openxmlformats.org/officeDocument/2006/relationships" xmlns:p="http://schemas.openxmlformats.org/presentationml/2006/main">
   <p:cSld>
@@ -220,7 +211,7 @@
           <a:p>
             <a:fld id="{C3E812A2-BA0E-4022-8B99-492E73CBDA70}" type="datetimeFigureOut">
               <a:rPr lang="en-US" smtClean="0"/>
-              <a:t>10/15/2025</a:t>
+              <a:t>10/17/2025</a:t>
             </a:fld>
             <a:endParaRPr lang="en-US"/>
           </a:p>
@@ -1269,7 +1260,7 @@
           <a:p>
             <a:fld id="{0C6C1A25-4366-4F4A-8222-0600C7D6B40D}" type="datetimeFigureOut">
               <a:rPr lang="en-US" smtClean="0"/>
-              <a:t>10/15/2025</a:t>
+              <a:t>10/17/2025</a:t>
             </a:fld>
             <a:endParaRPr lang="en-US"/>
           </a:p>
@@ -2397,7 +2388,7 @@
             <a:fld id="{90298CD5-6C1E-4009-B41F-6DF62E31D3BE}" type="datetimeFigureOut">
               <a:rPr lang="en-US" smtClean="0"/>
               <a:pPr/>
-              <a:t>10/15/2025</a:t>
+              <a:t>10/17/2025</a:t>
             </a:fld>
             <a:endParaRPr lang="en-US" dirty="0"/>
           </a:p>
@@ -3410,7 +3401,7 @@
             <a:fld id="{90298CD5-6C1E-4009-B41F-6DF62E31D3BE}" type="datetimeFigureOut">
               <a:rPr lang="en-US" smtClean="0"/>
               <a:pPr/>
-              <a:t>10/15/2025</a:t>
+              <a:t>10/17/2025</a:t>
             </a:fld>
             <a:endParaRPr lang="en-US" dirty="0"/>
           </a:p>
@@ -4582,7 +4573,7 @@
             <a:fld id="{90298CD5-6C1E-4009-B41F-6DF62E31D3BE}" type="datetimeFigureOut">
               <a:rPr lang="en-US" smtClean="0"/>
               <a:pPr/>
-              <a:t>10/15/2025</a:t>
+              <a:t>10/17/2025</a:t>
             </a:fld>
             <a:endParaRPr lang="en-US" dirty="0"/>
           </a:p>
@@ -5645,7 +5636,7 @@
             <a:fld id="{90298CD5-6C1E-4009-B41F-6DF62E31D3BE}" type="datetimeFigureOut">
               <a:rPr lang="en-US" smtClean="0"/>
               <a:pPr/>
-              <a:t>10/15/2025</a:t>
+              <a:t>10/17/2025</a:t>
             </a:fld>
             <a:endParaRPr lang="en-US" dirty="0"/>
           </a:p>
@@ -6293,7 +6284,7 @@
             <a:fld id="{90298CD5-6C1E-4009-B41F-6DF62E31D3BE}" type="datetimeFigureOut">
               <a:rPr lang="en-US" smtClean="0"/>
               <a:pPr/>
-              <a:t>10/15/2025</a:t>
+              <a:t>10/17/2025</a:t>
             </a:fld>
             <a:endParaRPr lang="en-US" dirty="0"/>
           </a:p>
@@ -7142,7 +7133,7 @@
             <a:fld id="{90298CD5-6C1E-4009-B41F-6DF62E31D3BE}" type="datetimeFigureOut">
               <a:rPr lang="en-US" smtClean="0"/>
               <a:pPr/>
-              <a:t>10/15/2025</a:t>
+              <a:t>10/17/2025</a:t>
             </a:fld>
             <a:endParaRPr lang="en-US" dirty="0"/>
           </a:p>
@@ -7318,7 +7309,7 @@
           <a:p>
             <a:fld id="{0C6C1A25-4366-4F4A-8222-0600C7D6B40D}" type="datetimeFigureOut">
               <a:rPr lang="en-US" smtClean="0"/>
-              <a:t>10/15/2025</a:t>
+              <a:t>10/17/2025</a:t>
             </a:fld>
             <a:endParaRPr lang="en-US"/>
           </a:p>
@@ -8316,7 +8307,7 @@
           <a:p>
             <a:fld id="{0C6C1A25-4366-4F4A-8222-0600C7D6B40D}" type="datetimeFigureOut">
               <a:rPr lang="en-US" smtClean="0"/>
-              <a:t>10/15/2025</a:t>
+              <a:t>10/17/2025</a:t>
             </a:fld>
             <a:endParaRPr lang="en-US"/>
           </a:p>
@@ -8522,7 +8513,7 @@
           <a:p>
             <a:fld id="{0C6C1A25-4366-4F4A-8222-0600C7D6B40D}" type="datetimeFigureOut">
               <a:rPr lang="en-US" smtClean="0"/>
-              <a:t>10/15/2025</a:t>
+              <a:t>10/17/2025</a:t>
             </a:fld>
             <a:endParaRPr lang="en-US"/>
           </a:p>
@@ -9584,7 +9575,7 @@
           <a:p>
             <a:fld id="{0C6C1A25-4366-4F4A-8222-0600C7D6B40D}" type="datetimeFigureOut">
               <a:rPr lang="en-US" smtClean="0"/>
-              <a:t>10/15/2025</a:t>
+              <a:t>10/17/2025</a:t>
             </a:fld>
             <a:endParaRPr lang="en-US"/>
           </a:p>
@@ -9856,7 +9847,7 @@
           <a:p>
             <a:fld id="{0C6C1A25-4366-4F4A-8222-0600C7D6B40D}" type="datetimeFigureOut">
               <a:rPr lang="en-US" smtClean="0"/>
-              <a:t>10/15/2025</a:t>
+              <a:t>10/17/2025</a:t>
             </a:fld>
             <a:endParaRPr lang="en-US"/>
           </a:p>
@@ -10238,7 +10229,7 @@
           <a:p>
             <a:fld id="{0C6C1A25-4366-4F4A-8222-0600C7D6B40D}" type="datetimeFigureOut">
               <a:rPr lang="en-US" smtClean="0"/>
-              <a:t>10/15/2025</a:t>
+              <a:t>10/17/2025</a:t>
             </a:fld>
             <a:endParaRPr lang="en-US"/>
           </a:p>
@@ -10356,7 +10347,7 @@
           <a:p>
             <a:fld id="{0C6C1A25-4366-4F4A-8222-0600C7D6B40D}" type="datetimeFigureOut">
               <a:rPr lang="en-US" smtClean="0"/>
-              <a:t>10/15/2025</a:t>
+              <a:t>10/17/2025</a:t>
             </a:fld>
             <a:endParaRPr lang="en-US"/>
           </a:p>
@@ -10451,7 +10442,7 @@
           <a:p>
             <a:fld id="{56E91E96-98B0-4413-9547-46F3504108EF}" type="datetimeFigureOut">
               <a:rPr lang="en-US" smtClean="0"/>
-              <a:t>10/15/2025</a:t>
+              <a:t>10/17/2025</a:t>
             </a:fld>
             <a:endParaRPr lang="en-US" dirty="0"/>
           </a:p>
@@ -11560,7 +11551,7 @@
           <a:p>
             <a:fld id="{0C6C1A25-4366-4F4A-8222-0600C7D6B40D}" type="datetimeFigureOut">
               <a:rPr lang="en-US" smtClean="0"/>
-              <a:t>10/15/2025</a:t>
+              <a:t>10/17/2025</a:t>
             </a:fld>
             <a:endParaRPr lang="en-US"/>
           </a:p>
@@ -12693,7 +12684,7 @@
           <a:p>
             <a:fld id="{C7616CA0-919D-4A49-9C8A-62FDFB3A5183}" type="datetimeFigureOut">
               <a:rPr lang="en-US" smtClean="0"/>
-              <a:t>10/15/2025</a:t>
+              <a:t>10/17/2025</a:t>
             </a:fld>
             <a:endParaRPr lang="en-US" dirty="0"/>
           </a:p>
@@ -13785,7 +13776,7 @@
             <a:fld id="{7E0D914D-B099-4142-A885-11F276715148}" type="datetimeFigureOut">
               <a:rPr lang="en-US" smtClean="0"/>
               <a:pPr/>
-              <a:t>10/15/2025</a:t>
+              <a:t>10/17/2025</a:t>
             </a:fld>
             <a:endParaRPr lang="en-US" dirty="0"/>
           </a:p>
@@ -18546,7 +18537,7 @@
           <a:p>
             <a:r>
               <a:rPr lang="en-US" sz="2400" dirty="0"/>
-              <a:t>Ubuntu via Windows Services for Linux (WSL)</a:t>
+              <a:t>Ubuntu via Windows Subsystem for Linux (WSL)</a:t>
             </a:r>
           </a:p>
           <a:p>
@@ -18995,8 +18986,14 @@
           </a:p>
           <a:p>
             <a:r>
+              <a:rPr lang="en-US" sz="2400" dirty="0">
+                <a:latin typeface="Consolas" panose="020B0609020204030204" pitchFamily="49" charset="0"/>
+              </a:rPr>
+              <a:t>Get-Alias</a:t>
+            </a:r>
+            <a:r>
               <a:rPr lang="en-US" sz="2400" dirty="0"/>
-              <a:t>Get-Alias will show you what an alias is executing</a:t>
+              <a:t> will show you what an alias is executing</a:t>
             </a:r>
           </a:p>
           <a:p>
@@ -19323,7 +19320,7 @@
         </p:spPr>
         <p:txBody>
           <a:bodyPr>
-            <a:normAutofit/>
+            <a:normAutofit fontScale="92500" lnSpcReduction="10000"/>
           </a:bodyPr>
           <a:lstStyle/>
           <a:p>
@@ -19344,6 +19341,25 @@
             <a:r>
               <a:rPr lang="en-US" sz="2400" dirty="0"/>
               <a:t> files in a directory to a backup directory</a:t>
+            </a:r>
+          </a:p>
+          <a:p>
+            <a:pPr lvl="1"/>
+            <a:r>
+              <a:rPr lang="en-US" sz="2200" b="1" dirty="0"/>
+              <a:t>Important</a:t>
+            </a:r>
+            <a:r>
+              <a:rPr lang="en-US" sz="2200" dirty="0"/>
+              <a:t>: make sure </a:t>
+            </a:r>
+            <a:r>
+              <a:rPr lang="en-US" sz="2200"/>
+              <a:t>the backup directory </a:t>
+            </a:r>
+            <a:r>
+              <a:rPr lang="en-US" sz="2200" dirty="0"/>
+              <a:t>exists</a:t>
             </a:r>
           </a:p>
           <a:p>
@@ -19358,7 +19374,19 @@
               <a:rPr lang="en-US" altLang="en-US" sz="2400" dirty="0">
                 <a:latin typeface="Consolas" panose="020B0609020204030204" pitchFamily="49" charset="0"/>
               </a:rPr>
-              <a:t>find ~/demo -type f -name '*.conf' -exec cp {} ~/demo/backup \;</a:t>
+              <a:t>find ./demo -</a:t>
+            </a:r>
+            <a:r>
+              <a:rPr lang="en-US" altLang="en-US" sz="2400" dirty="0" err="1">
+                <a:latin typeface="Consolas" panose="020B0609020204030204" pitchFamily="49" charset="0"/>
+              </a:rPr>
+              <a:t>maxdepth</a:t>
+            </a:r>
+            <a:r>
+              <a:rPr lang="en-US" altLang="en-US" sz="2400" dirty="0">
+                <a:latin typeface="Consolas" panose="020B0609020204030204" pitchFamily="49" charset="0"/>
+              </a:rPr>
+              <a:t> 1 -type f -name '*.conf' -exec cp -t {} ./demo/backup \;</a:t>
             </a:r>
           </a:p>
           <a:p>
@@ -19373,7 +19401,7 @@
               <a:rPr lang="en-US" sz="2400" dirty="0">
                 <a:latin typeface="Consolas" panose="020B0609020204030204" pitchFamily="49" charset="0"/>
               </a:rPr>
-              <a:t>cpi ~/demo/*.conf ~/demo/backup</a:t>
+              <a:t>cpi ./demo/*.conf ./demo/backup</a:t>
             </a:r>
           </a:p>
           <a:p>
@@ -19626,7 +19654,7 @@
                                         <p:tgtEl>
                                           <p:spTgt spid="3">
                                             <p:txEl>
-                                              <p:pRg st="5" end="5"/>
+                                              <p:pRg st="4" end="4"/>
                                             </p:txEl>
                                           </p:spTgt>
                                         </p:tgtEl>
@@ -19675,7 +19703,56 @@
                                         <p:tgtEl>
                                           <p:spTgt spid="3">
                                             <p:txEl>
-                                              <p:pRg st="4" end="4"/>
+                                              <p:pRg st="5" end="5"/>
+                                            </p:txEl>
+                                          </p:spTgt>
+                                        </p:tgtEl>
+                                        <p:attrNameLst>
+                                          <p:attrName>style.visibility</p:attrName>
+                                        </p:attrNameLst>
+                                      </p:cBhvr>
+                                      <p:to>
+                                        <p:strVal val="visible"/>
+                                      </p:to>
+                                    </p:set>
+                                  </p:childTnLst>
+                                </p:cTn>
+                              </p:par>
+                            </p:childTnLst>
+                          </p:cTn>
+                        </p:par>
+                      </p:childTnLst>
+                    </p:cTn>
+                  </p:par>
+                  <p:par>
+                    <p:cTn id="27" fill="hold">
+                      <p:stCondLst>
+                        <p:cond delay="indefinite"/>
+                      </p:stCondLst>
+                      <p:childTnLst>
+                        <p:par>
+                          <p:cTn id="28" fill="hold">
+                            <p:stCondLst>
+                              <p:cond delay="0"/>
+                            </p:stCondLst>
+                            <p:childTnLst>
+                              <p:par>
+                                <p:cTn id="29" presetID="1" presetClass="entr" presetSubtype="0" fill="hold" nodeType="clickEffect">
+                                  <p:stCondLst>
+                                    <p:cond delay="0"/>
+                                  </p:stCondLst>
+                                  <p:childTnLst>
+                                    <p:set>
+                                      <p:cBhvr>
+                                        <p:cTn id="30" dur="1" fill="hold">
+                                          <p:stCondLst>
+                                            <p:cond delay="0"/>
+                                          </p:stCondLst>
+                                        </p:cTn>
+                                        <p:tgtEl>
+                                          <p:spTgt spid="3">
+                                            <p:txEl>
+                                              <p:pRg st="6" end="6"/>
                                             </p:txEl>
                                           </p:spTgt>
                                         </p:tgtEl>
@@ -19818,45 +19895,65 @@
           <a:p>
             <a:pPr lvl="1"/>
             <a:r>
-              <a:rPr lang="en-US" sz="2000" dirty="0" err="1"/>
+              <a:rPr lang="en-US" sz="2000" dirty="0" err="1">
+                <a:latin typeface="Consolas" panose="020B0609020204030204" pitchFamily="49" charset="0"/>
+              </a:rPr>
               <a:t>ps</a:t>
             </a:r>
             <a:r>
-              <a:rPr lang="en-US" sz="2000" dirty="0"/>
+              <a:rPr lang="en-US" sz="2000" dirty="0">
+                <a:latin typeface="Consolas" panose="020B0609020204030204" pitchFamily="49" charset="0"/>
+              </a:rPr>
               <a:t> aux | grep -v grep | grep -</a:t>
             </a:r>
             <a:r>
-              <a:rPr lang="en-US" sz="2000" dirty="0" err="1"/>
+              <a:rPr lang="en-US" sz="2000" dirty="0" err="1">
+                <a:latin typeface="Consolas" panose="020B0609020204030204" pitchFamily="49" charset="0"/>
+              </a:rPr>
               <a:t>i</a:t>
             </a:r>
             <a:r>
-              <a:rPr lang="en-US" sz="2000" dirty="0"/>
+              <a:rPr lang="en-US" sz="2000" dirty="0">
+                <a:latin typeface="Consolas" panose="020B0609020204030204" pitchFamily="49" charset="0"/>
+              </a:rPr>
               <a:t> screen | awk ‘{print $2}’ | </a:t>
             </a:r>
             <a:r>
-              <a:rPr lang="en-US" sz="2000" dirty="0" err="1"/>
+              <a:rPr lang="en-US" sz="2000" dirty="0" err="1">
+                <a:latin typeface="Consolas" panose="020B0609020204030204" pitchFamily="49" charset="0"/>
+              </a:rPr>
               <a:t>xargs</a:t>
             </a:r>
             <a:r>
-              <a:rPr lang="en-US" sz="2000" dirty="0"/>
+              <a:rPr lang="en-US" sz="2000" dirty="0">
+                <a:latin typeface="Consolas" panose="020B0609020204030204" pitchFamily="49" charset="0"/>
+              </a:rPr>
               <a:t> kill</a:t>
             </a:r>
           </a:p>
           <a:p>
             <a:pPr lvl="1"/>
             <a:r>
-              <a:rPr lang="en-US" sz="2000" dirty="0" err="1"/>
+              <a:rPr lang="en-US" sz="2000" dirty="0" err="1">
+                <a:latin typeface="Consolas" panose="020B0609020204030204" pitchFamily="49" charset="0"/>
+              </a:rPr>
               <a:t>gps</a:t>
             </a:r>
             <a:r>
-              <a:rPr lang="en-US" sz="2000" dirty="0"/>
+              <a:rPr lang="en-US" sz="2000" dirty="0">
+                <a:latin typeface="Consolas" panose="020B0609020204030204" pitchFamily="49" charset="0"/>
+              </a:rPr>
               <a:t> screen | </a:t>
             </a:r>
             <a:r>
-              <a:rPr lang="en-US" sz="2000" dirty="0" err="1"/>
+              <a:rPr lang="en-US" sz="2000" dirty="0" err="1">
+                <a:latin typeface="Consolas" panose="020B0609020204030204" pitchFamily="49" charset="0"/>
+              </a:rPr>
               <a:t>spps</a:t>
             </a:r>
-            <a:endParaRPr lang="en-US" sz="2000" dirty="0"/>
+            <a:endParaRPr lang="en-US" sz="2000" dirty="0">
+              <a:latin typeface="Consolas" panose="020B0609020204030204" pitchFamily="49" charset="0"/>
+            </a:endParaRPr>
           </a:p>
         </p:txBody>
       </p:sp>
@@ -20885,7 +20982,7 @@
               <a:rPr lang="en-US" sz="1800" dirty="0">
                 <a:latin typeface="Consolas" panose="020B0609020204030204" pitchFamily="49" charset="0"/>
               </a:rPr>
-              <a:t>find ~/demo/certs -name "*.</a:t>
+              <a:t>find ./demo/certs -name "*.</a:t>
             </a:r>
             <a:r>
               <a:rPr lang="en-US" sz="1800" dirty="0" err="1">
@@ -20990,7 +21087,7 @@
               <a:rPr lang="en-US" sz="1800" dirty="0">
                 <a:latin typeface="Consolas" panose="020B0609020204030204" pitchFamily="49" charset="0"/>
               </a:rPr>
-              <a:t> ~/demo/certs/*.</a:t>
+              <a:t> ./demo/certs/*.</a:t>
             </a:r>
             <a:r>
               <a:rPr lang="en-US" sz="1800" dirty="0" err="1">

</xml_diff>